<commit_message>
Fix: Corrected roll number in presentation slides
</commit_message>
<xml_diff>
--- a/Crop_Advisory_System_Presentation.pptx
+++ b/Crop_Advisory_System_Presentation.pptx
@@ -17,6 +17,7 @@
     <p:sldId id="265" r:id="rId11"/>
     <p:sldId id="266" r:id="rId12"/>
     <p:sldId id="267" r:id="rId13"/>
+    <p:sldId id="268" r:id="rId14"/>
   </p:sldIdLst>
   <p:sldSz cx="9144000" cy="6858000" type="screen4x3"/>
   <p:notesSz cx="6858000" cy="9144000"/>
@@ -3171,10 +3172,7 @@
           </a:bodyPr>
           <a:lstStyle/>
           <a:p>
-            <a:r>
-              <a:rPr lang="en-US" sz="1400" dirty="0"/>
-              <a:t>TEAM 155</a:t>
-            </a:r>
+            <a:endParaRPr lang="en-US" sz="1400" dirty="0"/>
           </a:p>
           <a:p>
             <a:r>
@@ -3191,7 +3189,7 @@
           <a:p>
             <a:r>
               <a:rPr lang="en-US" sz="1400" dirty="0"/>
-              <a:t>24CSE303 SURAJ KUMAR NAYAK </a:t>
+              <a:t>24CSE304 SURAJ KUMAR NAYAK </a:t>
             </a:r>
             <a:endParaRPr lang="en-IN" sz="1400" dirty="0"/>
           </a:p>
@@ -3458,6 +3456,70 @@
         </p:txBody>
       </p:sp>
     </p:spTree>
+  </p:cSld>
+  <p:clrMapOvr>
+    <a:masterClrMapping/>
+  </p:clrMapOvr>
+</p:sld>
+</file>
+
+<file path=ppt/slides/slide13.xml><?xml version="1.0" encoding="utf-8"?>
+<p:sld xmlns:a="http://schemas.openxmlformats.org/drawingml/2006/main" xmlns:r="http://schemas.openxmlformats.org/officeDocument/2006/relationships" xmlns:p="http://schemas.openxmlformats.org/presentationml/2006/main">
+  <p:cSld>
+    <p:spTree>
+      <p:nvGrpSpPr>
+        <p:cNvPr id="1" name=""/>
+        <p:cNvGrpSpPr/>
+        <p:nvPr/>
+      </p:nvGrpSpPr>
+      <p:grpSpPr>
+        <a:xfrm>
+          <a:off x="0" y="0"/>
+          <a:ext cx="0" cy="0"/>
+          <a:chOff x="0" y="0"/>
+          <a:chExt cx="0" cy="0"/>
+        </a:xfrm>
+      </p:grpSpPr>
+      <p:sp>
+        <p:nvSpPr>
+          <p:cNvPr id="2" name="Title 1">
+            <a:extLst>
+              <a:ext uri="{FF2B5EF4-FFF2-40B4-BE49-F238E27FC236}">
+                <a16:creationId xmlns:a16="http://schemas.microsoft.com/office/drawing/2014/main" id="{FABB5369-597A-BE8B-15E5-43D096EC20D3}"/>
+              </a:ext>
+            </a:extLst>
+          </p:cNvPr>
+          <p:cNvSpPr>
+            <a:spLocks noGrp="1"/>
+          </p:cNvSpPr>
+          <p:nvPr>
+            <p:ph type="title"/>
+          </p:nvPr>
+        </p:nvSpPr>
+        <p:spPr>
+          <a:xfrm>
+            <a:off x="457200" y="2998174"/>
+            <a:ext cx="8229600" cy="1143000"/>
+          </a:xfrm>
+        </p:spPr>
+        <p:txBody>
+          <a:bodyPr/>
+          <a:lstStyle/>
+          <a:p>
+            <a:r>
+              <a:rPr lang="en-US" dirty="0"/>
+              <a:t>THANK YOU</a:t>
+            </a:r>
+            <a:endParaRPr lang="en-IN" dirty="0"/>
+          </a:p>
+        </p:txBody>
+      </p:sp>
+    </p:spTree>
+    <p:extLst>
+      <p:ext uri="{BB962C8B-B14F-4D97-AF65-F5344CB8AC3E}">
+        <p14:creationId xmlns:p14="http://schemas.microsoft.com/office/powerpoint/2010/main" val="1764447535"/>
+      </p:ext>
+    </p:extLst>
   </p:cSld>
   <p:clrMapOvr>
     <a:masterClrMapping/>

</xml_diff>